<commit_message>
tryp 10 cell types
</commit_message>
<xml_diff>
--- a/test_data/pipe.pptx
+++ b/test_data/pipe.pptx
@@ -6,6 +6,8 @@
   </p:sldMasterIdLst>
   <p:sldIdLst>
     <p:sldId id="257" r:id="rId2"/>
+    <p:sldId id="258" r:id="rId3"/>
+    <p:sldId id="259" r:id="rId4"/>
   </p:sldIdLst>
   <p:sldSz cx="9144000" cy="6858000" type="screen4x3"/>
   <p:notesSz cx="6858000" cy="9144000"/>
@@ -3251,7 +3253,7 @@
               <a:buAutoNum type="arabicPeriod"/>
             </a:pPr>
             <a:r>
-              <a:rPr lang="en-US" sz="1800" smtClean="0"/>
+              <a:rPr lang="en-US" sz="1800" dirty="0" smtClean="0"/>
               <a:t>Add </a:t>
             </a:r>
             <a:r>
@@ -3438,11 +3440,15 @@
             </a:pPr>
             <a:r>
               <a:rPr lang="en-US" sz="1800" dirty="0" err="1" smtClean="0"/>
-              <a:t>Mvn_log_p_ij</a:t>
-            </a:r>
-            <a:r>
-              <a:rPr lang="en-US" sz="1800" dirty="0" smtClean="0"/>
-              <a:t> = -</a:t>
+              <a:t>Mvn_log_p_j</a:t>
+            </a:r>
+            <a:r>
+              <a:rPr lang="en-US" sz="1800" dirty="0" smtClean="0"/>
+              <a:t> </a:t>
+            </a:r>
+            <a:r>
+              <a:rPr lang="en-US" sz="1800" dirty="0" smtClean="0"/>
+              <a:t>= -</a:t>
             </a:r>
             <a:r>
               <a:rPr lang="en-US" sz="1800" dirty="0" smtClean="0"/>
@@ -3458,7 +3464,7 @@
             </a:r>
             <a:r>
               <a:rPr lang="en-US" sz="1800" dirty="0" err="1" smtClean="0"/>
-              <a:t>data_sig_cov_ij</a:t>
+              <a:t>data_sig_cov_j</a:t>
             </a:r>
             <a:r>
               <a:rPr lang="en-US" sz="1800" dirty="0" smtClean="0"/>
@@ -3470,7 +3476,7 @@
             </a:r>
             <a:r>
               <a:rPr lang="en-US" sz="1800" dirty="0" err="1" smtClean="0"/>
-              <a:t>data_sig_matrix-data_sig_mean_ij</a:t>
+              <a:t>data_sig_matrix-data_sig_mean_j</a:t>
             </a:r>
             <a:r>
               <a:rPr lang="en-US" sz="1800" dirty="0" smtClean="0"/>
@@ -3486,7 +3492,7 @@
             </a:r>
             <a:r>
               <a:rPr lang="en-US" sz="1800" dirty="0" err="1" smtClean="0"/>
-              <a:t>data_sig_cov_ij</a:t>
+              <a:t>data_sig_cov_j</a:t>
             </a:r>
             <a:r>
               <a:rPr lang="en-US" sz="1800" dirty="0" smtClean="0"/>
@@ -3498,7 +3504,7 @@
             </a:r>
             <a:r>
               <a:rPr lang="en-US" sz="1800" dirty="0" err="1" smtClean="0"/>
-              <a:t>data_sig_matrix-data_sig_mean_ij</a:t>
+              <a:t>data_sig_matrix-data_sig_mean_j</a:t>
             </a:r>
             <a:r>
               <a:rPr lang="en-US" sz="1800" dirty="0" smtClean="0"/>
@@ -3578,7 +3584,7 @@
             </a:pPr>
             <a:r>
               <a:rPr lang="en-US" sz="1800" dirty="0" smtClean="0"/>
-              <a:t>If </a:t>
+              <a:t>### If </a:t>
             </a:r>
             <a:r>
               <a:rPr lang="en-US" sz="1800" dirty="0" err="1" smtClean="0"/>
@@ -3620,7 +3626,11 @@
             </a:pPr>
             <a:r>
               <a:rPr lang="en-US" sz="1800" dirty="0" smtClean="0"/>
-              <a:t>Foe new clusters with less than 100 peak, relabel them as </a:t>
+              <a:t>For </a:t>
+            </a:r>
+            <a:r>
+              <a:rPr lang="en-US" sz="1800" dirty="0" smtClean="0"/>
+              <a:t>new clusters with less than 100 peak, relabel them as </a:t>
             </a:r>
             <a:r>
               <a:rPr lang="en-US" sz="1800" dirty="0" smtClean="0"/>
@@ -3780,6 +3790,566 @@
     <p:extLst>
       <p:ext uri="{BB962C8B-B14F-4D97-AF65-F5344CB8AC3E}">
         <p14:creationId xmlns:p14="http://schemas.microsoft.com/office/powerpoint/2010/main" val="1840562224"/>
+      </p:ext>
+    </p:extLst>
+  </p:cSld>
+  <p:clrMapOvr>
+    <a:masterClrMapping/>
+  </p:clrMapOvr>
+</p:sld>
+</file>
+
+<file path=ppt/slides/slide2.xml><?xml version="1.0" encoding="utf-8"?>
+<p:sld xmlns:a="http://schemas.openxmlformats.org/drawingml/2006/main" xmlns:r="http://schemas.openxmlformats.org/officeDocument/2006/relationships" xmlns:p="http://schemas.openxmlformats.org/presentationml/2006/main">
+  <p:cSld>
+    <p:spTree>
+      <p:nvGrpSpPr>
+        <p:cNvPr id="1" name=""/>
+        <p:cNvGrpSpPr/>
+        <p:nvPr/>
+      </p:nvGrpSpPr>
+      <p:grpSpPr>
+        <a:xfrm>
+          <a:off x="0" y="0"/>
+          <a:ext cx="0" cy="0"/>
+          <a:chOff x="0" y="0"/>
+          <a:chExt cx="0" cy="0"/>
+        </a:xfrm>
+      </p:grpSpPr>
+      <p:pic>
+        <p:nvPicPr>
+          <p:cNvPr id="4" name="Picture 3"/>
+          <p:cNvPicPr>
+            <a:picLocks/>
+          </p:cNvPicPr>
+          <p:nvPr/>
+        </p:nvPicPr>
+        <p:blipFill>
+          <a:blip r:embed="rId2">
+            <a:extLst>
+              <a:ext uri="{28A0092B-C50C-407E-A947-70E740481C1C}">
+                <a14:useLocalDpi xmlns:a14="http://schemas.microsoft.com/office/drawing/2010/main" val="0"/>
+              </a:ext>
+            </a:extLst>
+          </a:blip>
+          <a:stretch>
+            <a:fillRect/>
+          </a:stretch>
+        </p:blipFill>
+        <p:spPr>
+          <a:xfrm>
+            <a:off x="612648" y="1097280"/>
+            <a:ext cx="2743200" cy="5486400"/>
+          </a:xfrm>
+          <a:prstGeom prst="rect">
+            <a:avLst/>
+          </a:prstGeom>
+        </p:spPr>
+      </p:pic>
+      <p:pic>
+        <p:nvPicPr>
+          <p:cNvPr id="5" name="Picture 4"/>
+          <p:cNvPicPr>
+            <a:picLocks/>
+          </p:cNvPicPr>
+          <p:nvPr/>
+        </p:nvPicPr>
+        <p:blipFill>
+          <a:blip r:embed="rId3">
+            <a:extLst>
+              <a:ext uri="{28A0092B-C50C-407E-A947-70E740481C1C}">
+                <a14:useLocalDpi xmlns:a14="http://schemas.microsoft.com/office/drawing/2010/main" val="0"/>
+              </a:ext>
+            </a:extLst>
+          </a:blip>
+          <a:stretch>
+            <a:fillRect/>
+          </a:stretch>
+        </p:blipFill>
+        <p:spPr>
+          <a:xfrm>
+            <a:off x="6202680" y="1097280"/>
+            <a:ext cx="2743200" cy="5486400"/>
+          </a:xfrm>
+          <a:prstGeom prst="rect">
+            <a:avLst/>
+          </a:prstGeom>
+        </p:spPr>
+      </p:pic>
+      <p:pic>
+        <p:nvPicPr>
+          <p:cNvPr id="6" name="Picture 5"/>
+          <p:cNvPicPr>
+            <a:picLocks noChangeAspect="1"/>
+          </p:cNvPicPr>
+          <p:nvPr/>
+        </p:nvPicPr>
+        <p:blipFill>
+          <a:blip r:embed="rId4">
+            <a:extLst>
+              <a:ext uri="{28A0092B-C50C-407E-A947-70E740481C1C}">
+                <a14:useLocalDpi xmlns:a14="http://schemas.microsoft.com/office/drawing/2010/main" val="0"/>
+              </a:ext>
+            </a:extLst>
+          </a:blip>
+          <a:stretch>
+            <a:fillRect/>
+          </a:stretch>
+        </p:blipFill>
+        <p:spPr>
+          <a:xfrm>
+            <a:off x="3375660" y="1097280"/>
+            <a:ext cx="2560320" cy="2560320"/>
+          </a:xfrm>
+          <a:prstGeom prst="rect">
+            <a:avLst/>
+          </a:prstGeom>
+        </p:spPr>
+      </p:pic>
+      <p:sp>
+        <p:nvSpPr>
+          <p:cNvPr id="7" name="TextBox 6"/>
+          <p:cNvSpPr txBox="1"/>
+          <p:nvPr/>
+        </p:nvSpPr>
+        <p:spPr>
+          <a:xfrm>
+            <a:off x="541020" y="512505"/>
+            <a:ext cx="2788920" cy="584775"/>
+          </a:xfrm>
+          <a:prstGeom prst="rect">
+            <a:avLst/>
+          </a:prstGeom>
+          <a:noFill/>
+        </p:spPr>
+        <p:txBody>
+          <a:bodyPr wrap="square" rtlCol="0">
+            <a:spAutoFit/>
+          </a:bodyPr>
+          <a:lstStyle/>
+          <a:p>
+            <a:r>
+              <a:rPr lang="en-US" sz="1600" dirty="0" smtClean="0"/>
+              <a:t>Use Homer peak calling label (</a:t>
+            </a:r>
+            <a:r>
+              <a:rPr lang="en-US" sz="1600" dirty="0" err="1" smtClean="0"/>
+              <a:t>PKnorm</a:t>
+            </a:r>
+            <a:r>
+              <a:rPr lang="en-US" sz="1600" dirty="0" smtClean="0"/>
+              <a:t> signal) (10 cell types)</a:t>
+            </a:r>
+            <a:endParaRPr lang="en-US" sz="1600" dirty="0"/>
+          </a:p>
+        </p:txBody>
+      </p:sp>
+      <p:sp>
+        <p:nvSpPr>
+          <p:cNvPr id="8" name="TextBox 7"/>
+          <p:cNvSpPr txBox="1"/>
+          <p:nvPr/>
+        </p:nvSpPr>
+        <p:spPr>
+          <a:xfrm>
+            <a:off x="6202680" y="758726"/>
+            <a:ext cx="2788920" cy="338554"/>
+          </a:xfrm>
+          <a:prstGeom prst="rect">
+            <a:avLst/>
+          </a:prstGeom>
+          <a:noFill/>
+        </p:spPr>
+        <p:txBody>
+          <a:bodyPr wrap="square" rtlCol="0">
+            <a:spAutoFit/>
+          </a:bodyPr>
+          <a:lstStyle/>
+          <a:p>
+            <a:r>
+              <a:rPr lang="en-US" sz="1600" smtClean="0"/>
+              <a:t>Reassign labels based on MVN</a:t>
+            </a:r>
+            <a:endParaRPr lang="en-US" sz="1600" dirty="0"/>
+          </a:p>
+        </p:txBody>
+      </p:sp>
+      <p:sp>
+        <p:nvSpPr>
+          <p:cNvPr id="9" name="TextBox 8"/>
+          <p:cNvSpPr txBox="1"/>
+          <p:nvPr/>
+        </p:nvSpPr>
+        <p:spPr>
+          <a:xfrm>
+            <a:off x="3438144" y="266283"/>
+            <a:ext cx="2471928" cy="830997"/>
+          </a:xfrm>
+          <a:prstGeom prst="rect">
+            <a:avLst/>
+          </a:prstGeom>
+          <a:noFill/>
+        </p:spPr>
+        <p:txBody>
+          <a:bodyPr wrap="square" rtlCol="0">
+            <a:spAutoFit/>
+          </a:bodyPr>
+          <a:lstStyle/>
+          <a:p>
+            <a:r>
+              <a:rPr lang="en-US" sz="1600" dirty="0" smtClean="0"/>
+              <a:t>New label is based on the mean signal of each cell in the new </a:t>
+            </a:r>
+            <a:r>
+              <a:rPr lang="en-US" sz="1600" dirty="0" err="1" smtClean="0"/>
+              <a:t>heatmap</a:t>
+            </a:r>
+            <a:r>
+              <a:rPr lang="en-US" sz="1600" dirty="0" smtClean="0"/>
+              <a:t>.</a:t>
+            </a:r>
+            <a:endParaRPr lang="en-US" sz="1600" dirty="0"/>
+          </a:p>
+        </p:txBody>
+      </p:sp>
+      <p:pic>
+        <p:nvPicPr>
+          <p:cNvPr id="10" name="Picture 9"/>
+          <p:cNvPicPr>
+            <a:picLocks noChangeAspect="1"/>
+          </p:cNvPicPr>
+          <p:nvPr/>
+        </p:nvPicPr>
+        <p:blipFill>
+          <a:blip r:embed="rId5">
+            <a:extLst>
+              <a:ext uri="{28A0092B-C50C-407E-A947-70E740481C1C}">
+                <a14:useLocalDpi xmlns:a14="http://schemas.microsoft.com/office/drawing/2010/main" val="0"/>
+              </a:ext>
+            </a:extLst>
+          </a:blip>
+          <a:stretch>
+            <a:fillRect/>
+          </a:stretch>
+        </p:blipFill>
+        <p:spPr>
+          <a:xfrm>
+            <a:off x="3355848" y="4224528"/>
+            <a:ext cx="2560320" cy="2560320"/>
+          </a:xfrm>
+          <a:prstGeom prst="rect">
+            <a:avLst/>
+          </a:prstGeom>
+        </p:spPr>
+      </p:pic>
+      <p:sp>
+        <p:nvSpPr>
+          <p:cNvPr id="11" name="TextBox 10"/>
+          <p:cNvSpPr txBox="1"/>
+          <p:nvPr/>
+        </p:nvSpPr>
+        <p:spPr>
+          <a:xfrm>
+            <a:off x="3378708" y="3657600"/>
+            <a:ext cx="2471928" cy="830997"/>
+          </a:xfrm>
+          <a:prstGeom prst="rect">
+            <a:avLst/>
+          </a:prstGeom>
+          <a:noFill/>
+        </p:spPr>
+        <p:txBody>
+          <a:bodyPr wrap="square" rtlCol="0">
+            <a:spAutoFit/>
+          </a:bodyPr>
+          <a:lstStyle/>
+          <a:p>
+            <a:r>
+              <a:rPr lang="en-US" sz="1600" dirty="0" smtClean="0"/>
+              <a:t>The Number of peaks that change labels in each iteration.</a:t>
+            </a:r>
+            <a:endParaRPr lang="en-US" sz="1600" dirty="0"/>
+          </a:p>
+        </p:txBody>
+      </p:sp>
+      <p:sp>
+        <p:nvSpPr>
+          <p:cNvPr id="12" name="Rectangle 11"/>
+          <p:cNvSpPr/>
+          <p:nvPr/>
+        </p:nvSpPr>
+        <p:spPr>
+          <a:xfrm rot="16200000">
+            <a:off x="-350570" y="3180547"/>
+            <a:ext cx="1413849" cy="369332"/>
+          </a:xfrm>
+          <a:prstGeom prst="rect">
+            <a:avLst/>
+          </a:prstGeom>
+        </p:spPr>
+        <p:txBody>
+          <a:bodyPr wrap="none">
+            <a:spAutoFit/>
+          </a:bodyPr>
+          <a:lstStyle/>
+          <a:p>
+            <a:r>
+              <a:rPr lang="en-US" dirty="0" smtClean="0"/>
+              <a:t>62 index-sets</a:t>
+            </a:r>
+            <a:endParaRPr lang="en-US" dirty="0"/>
+          </a:p>
+        </p:txBody>
+      </p:sp>
+      <p:sp>
+        <p:nvSpPr>
+          <p:cNvPr id="13" name="Rectangle 12"/>
+          <p:cNvSpPr/>
+          <p:nvPr/>
+        </p:nvSpPr>
+        <p:spPr>
+          <a:xfrm rot="16200000">
+            <a:off x="5319734" y="3180547"/>
+            <a:ext cx="1413849" cy="369332"/>
+          </a:xfrm>
+          <a:prstGeom prst="rect">
+            <a:avLst/>
+          </a:prstGeom>
+        </p:spPr>
+        <p:txBody>
+          <a:bodyPr wrap="none">
+            <a:spAutoFit/>
+          </a:bodyPr>
+          <a:lstStyle/>
+          <a:p>
+            <a:r>
+              <a:rPr lang="en-US" dirty="0" smtClean="0"/>
+              <a:t>51 index-sets</a:t>
+            </a:r>
+            <a:endParaRPr lang="en-US" dirty="0"/>
+          </a:p>
+        </p:txBody>
+      </p:sp>
+    </p:spTree>
+    <p:extLst>
+      <p:ext uri="{BB962C8B-B14F-4D97-AF65-F5344CB8AC3E}">
+        <p14:creationId xmlns:p14="http://schemas.microsoft.com/office/powerpoint/2010/main" val="1213745085"/>
+      </p:ext>
+    </p:extLst>
+  </p:cSld>
+  <p:clrMapOvr>
+    <a:masterClrMapping/>
+  </p:clrMapOvr>
+</p:sld>
+</file>
+
+<file path=ppt/slides/slide3.xml><?xml version="1.0" encoding="utf-8"?>
+<p:sld xmlns:a="http://schemas.openxmlformats.org/drawingml/2006/main" xmlns:r="http://schemas.openxmlformats.org/officeDocument/2006/relationships" xmlns:p="http://schemas.openxmlformats.org/presentationml/2006/main">
+  <p:cSld>
+    <p:spTree>
+      <p:nvGrpSpPr>
+        <p:cNvPr id="1" name=""/>
+        <p:cNvGrpSpPr/>
+        <p:nvPr/>
+      </p:nvGrpSpPr>
+      <p:grpSpPr>
+        <a:xfrm>
+          <a:off x="0" y="0"/>
+          <a:ext cx="0" cy="0"/>
+          <a:chOff x="0" y="0"/>
+          <a:chExt cx="0" cy="0"/>
+        </a:xfrm>
+      </p:grpSpPr>
+      <p:pic>
+        <p:nvPicPr>
+          <p:cNvPr id="6" name="Picture 5"/>
+          <p:cNvPicPr>
+            <a:picLocks/>
+          </p:cNvPicPr>
+          <p:nvPr/>
+        </p:nvPicPr>
+        <p:blipFill>
+          <a:blip r:embed="rId2">
+            <a:extLst>
+              <a:ext uri="{28A0092B-C50C-407E-A947-70E740481C1C}">
+                <a14:useLocalDpi xmlns:a14="http://schemas.microsoft.com/office/drawing/2010/main" val="0"/>
+              </a:ext>
+            </a:extLst>
+          </a:blip>
+          <a:stretch>
+            <a:fillRect/>
+          </a:stretch>
+        </p:blipFill>
+        <p:spPr>
+          <a:xfrm>
+            <a:off x="5020056" y="978408"/>
+            <a:ext cx="3657600" cy="5486400"/>
+          </a:xfrm>
+          <a:prstGeom prst="rect">
+            <a:avLst/>
+          </a:prstGeom>
+        </p:spPr>
+      </p:pic>
+      <p:pic>
+        <p:nvPicPr>
+          <p:cNvPr id="7" name="Picture 6"/>
+          <p:cNvPicPr>
+            <a:picLocks/>
+          </p:cNvPicPr>
+          <p:nvPr/>
+        </p:nvPicPr>
+        <p:blipFill>
+          <a:blip r:embed="rId3">
+            <a:extLst>
+              <a:ext uri="{28A0092B-C50C-407E-A947-70E740481C1C}">
+                <a14:useLocalDpi xmlns:a14="http://schemas.microsoft.com/office/drawing/2010/main" val="0"/>
+              </a:ext>
+            </a:extLst>
+          </a:blip>
+          <a:stretch>
+            <a:fillRect/>
+          </a:stretch>
+        </p:blipFill>
+        <p:spPr>
+          <a:xfrm>
+            <a:off x="886968" y="978408"/>
+            <a:ext cx="3657600" cy="5486400"/>
+          </a:xfrm>
+          <a:prstGeom prst="rect">
+            <a:avLst/>
+          </a:prstGeom>
+        </p:spPr>
+      </p:pic>
+      <p:sp>
+        <p:nvSpPr>
+          <p:cNvPr id="8" name="TextBox 7"/>
+          <p:cNvSpPr txBox="1"/>
+          <p:nvPr/>
+        </p:nvSpPr>
+        <p:spPr>
+          <a:xfrm>
+            <a:off x="886968" y="393633"/>
+            <a:ext cx="2788920" cy="584775"/>
+          </a:xfrm>
+          <a:prstGeom prst="rect">
+            <a:avLst/>
+          </a:prstGeom>
+          <a:noFill/>
+        </p:spPr>
+        <p:txBody>
+          <a:bodyPr wrap="square" rtlCol="0">
+            <a:spAutoFit/>
+          </a:bodyPr>
+          <a:lstStyle/>
+          <a:p>
+            <a:r>
+              <a:rPr lang="en-US" sz="1600" dirty="0" smtClean="0"/>
+              <a:t>Use Homer peak calling label (</a:t>
+            </a:r>
+            <a:r>
+              <a:rPr lang="en-US" sz="1600" dirty="0" err="1" smtClean="0"/>
+              <a:t>PKnorm</a:t>
+            </a:r>
+            <a:r>
+              <a:rPr lang="en-US" sz="1600" dirty="0" smtClean="0"/>
+              <a:t> signal) (18 cell types)</a:t>
+            </a:r>
+            <a:endParaRPr lang="en-US" sz="1600" dirty="0"/>
+          </a:p>
+        </p:txBody>
+      </p:sp>
+      <p:sp>
+        <p:nvSpPr>
+          <p:cNvPr id="9" name="TextBox 8"/>
+          <p:cNvSpPr txBox="1"/>
+          <p:nvPr/>
+        </p:nvSpPr>
+        <p:spPr>
+          <a:xfrm>
+            <a:off x="4983478" y="639854"/>
+            <a:ext cx="2788920" cy="338554"/>
+          </a:xfrm>
+          <a:prstGeom prst="rect">
+            <a:avLst/>
+          </a:prstGeom>
+          <a:noFill/>
+        </p:spPr>
+        <p:txBody>
+          <a:bodyPr wrap="square" rtlCol="0">
+            <a:spAutoFit/>
+          </a:bodyPr>
+          <a:lstStyle/>
+          <a:p>
+            <a:r>
+              <a:rPr lang="en-US" sz="1600" smtClean="0"/>
+              <a:t>Reassign labels based on MVN</a:t>
+            </a:r>
+            <a:endParaRPr lang="en-US" sz="1600" dirty="0"/>
+          </a:p>
+        </p:txBody>
+      </p:sp>
+      <p:sp>
+        <p:nvSpPr>
+          <p:cNvPr id="10" name="Rectangle 9"/>
+          <p:cNvSpPr/>
+          <p:nvPr/>
+        </p:nvSpPr>
+        <p:spPr>
+          <a:xfrm rot="16200000">
+            <a:off x="-207648" y="3190533"/>
+            <a:ext cx="1530868" cy="369332"/>
+          </a:xfrm>
+          <a:prstGeom prst="rect">
+            <a:avLst/>
+          </a:prstGeom>
+        </p:spPr>
+        <p:txBody>
+          <a:bodyPr wrap="none">
+            <a:spAutoFit/>
+          </a:bodyPr>
+          <a:lstStyle/>
+          <a:p>
+            <a:r>
+              <a:rPr lang="en-US" dirty="0" smtClean="0"/>
+              <a:t>217 index-sets</a:t>
+            </a:r>
+            <a:endParaRPr lang="en-US" dirty="0"/>
+          </a:p>
+        </p:txBody>
+      </p:sp>
+      <p:sp>
+        <p:nvSpPr>
+          <p:cNvPr id="11" name="Rectangle 10"/>
+          <p:cNvSpPr/>
+          <p:nvPr/>
+        </p:nvSpPr>
+        <p:spPr>
+          <a:xfrm rot="16200000">
+            <a:off x="4033379" y="3190533"/>
+            <a:ext cx="1530868" cy="369332"/>
+          </a:xfrm>
+          <a:prstGeom prst="rect">
+            <a:avLst/>
+          </a:prstGeom>
+        </p:spPr>
+        <p:txBody>
+          <a:bodyPr wrap="none">
+            <a:spAutoFit/>
+          </a:bodyPr>
+          <a:lstStyle/>
+          <a:p>
+            <a:r>
+              <a:rPr lang="en-US" dirty="0" smtClean="0"/>
+              <a:t>109 index-sets</a:t>
+            </a:r>
+            <a:endParaRPr lang="en-US" dirty="0"/>
+          </a:p>
+        </p:txBody>
+      </p:sp>
+    </p:spTree>
+    <p:extLst>
+      <p:ext uri="{BB962C8B-B14F-4D97-AF65-F5344CB8AC3E}">
+        <p14:creationId xmlns:p14="http://schemas.microsoft.com/office/powerpoint/2010/main" val="30200043"/>
       </p:ext>
     </p:extLst>
   </p:cSld>

</xml_diff>